<commit_message>
2a versão do PITCHcom logo adicionado
</commit_message>
<xml_diff>
--- a/PastaDocumentos/PITCH.pptx
+++ b/PastaDocumentos/PITCH.pptx
@@ -104,6 +104,11 @@
       </a:defRPr>
     </a:lvl9pPr>
   </p:defaultTextStyle>
+  <p:extLst>
+    <p:ext uri="{EFAFB233-063F-42B5-8137-9DF3F51BA10A}">
+      <p15:sldGuideLst xmlns:p15="http://schemas.microsoft.com/office/powerpoint/2012/main"/>
+    </p:ext>
+  </p:extLst>
 </p:presentation>
 </file>
 
@@ -3337,7 +3342,12 @@
             <p:ph type="ctrTitle"/>
           </p:nvPr>
         </p:nvSpPr>
-        <p:spPr/>
+        <p:spPr>
+          <a:xfrm>
+            <a:off x="1284157" y="1257509"/>
+            <a:ext cx="9144000" cy="2387600"/>
+          </a:xfrm>
+        </p:spPr>
         <p:txBody>
           <a:bodyPr/>
           <a:lstStyle/>
@@ -3377,6 +3387,56 @@
             <a:r>
               <a:rPr lang="pt-BR"/>
               <a:t>Projeto Exemplo GIT</a:t>
+            </a:r>
+            <a:endParaRPr lang="en-US"/>
+          </a:p>
+        </p:txBody>
+      </p:sp>
+      <p:sp>
+        <p:nvSpPr>
+          <p:cNvPr id="4" name="Oval 3">
+            <a:extLst>
+              <a:ext uri="{FF2B5EF4-FFF2-40B4-BE49-F238E27FC236}">
+                <a16:creationId xmlns:a16="http://schemas.microsoft.com/office/drawing/2014/main" id="{363A974D-7A1E-44B4-A5B7-36993B254603}"/>
+              </a:ext>
+            </a:extLst>
+          </p:cNvPr>
+          <p:cNvSpPr/>
+          <p:nvPr/>
+        </p:nvSpPr>
+        <p:spPr>
+          <a:xfrm>
+            <a:off x="7779895" y="1600200"/>
+            <a:ext cx="2368446" cy="1655762"/>
+          </a:xfrm>
+          <a:prstGeom prst="ellipse">
+            <a:avLst/>
+          </a:prstGeom>
+        </p:spPr>
+        <p:style>
+          <a:lnRef idx="2">
+            <a:schemeClr val="accent1">
+              <a:shade val="50000"/>
+            </a:schemeClr>
+          </a:lnRef>
+          <a:fillRef idx="1">
+            <a:schemeClr val="accent1"/>
+          </a:fillRef>
+          <a:effectRef idx="0">
+            <a:schemeClr val="accent1"/>
+          </a:effectRef>
+          <a:fontRef idx="minor">
+            <a:schemeClr val="lt1"/>
+          </a:fontRef>
+        </p:style>
+        <p:txBody>
+          <a:bodyPr rtlCol="0" anchor="ctr"/>
+          <a:lstStyle/>
+          <a:p>
+            <a:pPr algn="ctr"/>
+            <a:r>
+              <a:rPr lang="pt-BR"/>
+              <a:t>LOGO DO PROJETO</a:t>
             </a:r>
             <a:endParaRPr lang="en-US"/>
           </a:p>

</xml_diff>